<commit_message>
write some documents about graphics notes
</commit_message>
<xml_diff>
--- a/text-notes/graphic basics/1. Projection Transformations.assets/Transformations.pptx
+++ b/text-notes/graphic basics/1. Projection Transformations.assets/Transformations.pptx
@@ -106,6 +106,11 @@
       </a:defRPr>
     </a:lvl9pPr>
   </p:defaultTextStyle>
+  <p:extLst>
+    <p:ext uri="{EFAFB233-063F-42B5-8137-9DF3F51BA10A}">
+      <p15:sldGuideLst xmlns:p15="http://schemas.microsoft.com/office/powerpoint/2012/main"/>
+    </p:ext>
+  </p:extLst>
 </p:presentation>
 </file>
 
@@ -256,7 +261,7 @@
           <a:p>
             <a:fld id="{5A97F598-E2C5-41F4-93C0-94E73E3AC985}" type="datetimeFigureOut">
               <a:rPr lang="zh-CN" altLang="en-US" smtClean="0"/>
-              <a:t>2021/11/25</a:t>
+              <a:t>2022/7/5</a:t>
             </a:fld>
             <a:endParaRPr lang="zh-CN" altLang="en-US"/>
           </a:p>
@@ -454,7 +459,7 @@
           <a:p>
             <a:fld id="{5A97F598-E2C5-41F4-93C0-94E73E3AC985}" type="datetimeFigureOut">
               <a:rPr lang="zh-CN" altLang="en-US" smtClean="0"/>
-              <a:t>2021/11/25</a:t>
+              <a:t>2022/7/5</a:t>
             </a:fld>
             <a:endParaRPr lang="zh-CN" altLang="en-US"/>
           </a:p>
@@ -662,7 +667,7 @@
           <a:p>
             <a:fld id="{5A97F598-E2C5-41F4-93C0-94E73E3AC985}" type="datetimeFigureOut">
               <a:rPr lang="zh-CN" altLang="en-US" smtClean="0"/>
-              <a:t>2021/11/25</a:t>
+              <a:t>2022/7/5</a:t>
             </a:fld>
             <a:endParaRPr lang="zh-CN" altLang="en-US"/>
           </a:p>
@@ -860,7 +865,7 @@
           <a:p>
             <a:fld id="{5A97F598-E2C5-41F4-93C0-94E73E3AC985}" type="datetimeFigureOut">
               <a:rPr lang="zh-CN" altLang="en-US" smtClean="0"/>
-              <a:t>2021/11/25</a:t>
+              <a:t>2022/7/5</a:t>
             </a:fld>
             <a:endParaRPr lang="zh-CN" altLang="en-US"/>
           </a:p>
@@ -1135,7 +1140,7 @@
           <a:p>
             <a:fld id="{5A97F598-E2C5-41F4-93C0-94E73E3AC985}" type="datetimeFigureOut">
               <a:rPr lang="zh-CN" altLang="en-US" smtClean="0"/>
-              <a:t>2021/11/25</a:t>
+              <a:t>2022/7/5</a:t>
             </a:fld>
             <a:endParaRPr lang="zh-CN" altLang="en-US"/>
           </a:p>
@@ -1400,7 +1405,7 @@
           <a:p>
             <a:fld id="{5A97F598-E2C5-41F4-93C0-94E73E3AC985}" type="datetimeFigureOut">
               <a:rPr lang="zh-CN" altLang="en-US" smtClean="0"/>
-              <a:t>2021/11/25</a:t>
+              <a:t>2022/7/5</a:t>
             </a:fld>
             <a:endParaRPr lang="zh-CN" altLang="en-US"/>
           </a:p>
@@ -1812,7 +1817,7 @@
           <a:p>
             <a:fld id="{5A97F598-E2C5-41F4-93C0-94E73E3AC985}" type="datetimeFigureOut">
               <a:rPr lang="zh-CN" altLang="en-US" smtClean="0"/>
-              <a:t>2021/11/25</a:t>
+              <a:t>2022/7/5</a:t>
             </a:fld>
             <a:endParaRPr lang="zh-CN" altLang="en-US"/>
           </a:p>
@@ -1953,7 +1958,7 @@
           <a:p>
             <a:fld id="{5A97F598-E2C5-41F4-93C0-94E73E3AC985}" type="datetimeFigureOut">
               <a:rPr lang="zh-CN" altLang="en-US" smtClean="0"/>
-              <a:t>2021/11/25</a:t>
+              <a:t>2022/7/5</a:t>
             </a:fld>
             <a:endParaRPr lang="zh-CN" altLang="en-US"/>
           </a:p>
@@ -2066,7 +2071,7 @@
           <a:p>
             <a:fld id="{5A97F598-E2C5-41F4-93C0-94E73E3AC985}" type="datetimeFigureOut">
               <a:rPr lang="zh-CN" altLang="en-US" smtClean="0"/>
-              <a:t>2021/11/25</a:t>
+              <a:t>2022/7/5</a:t>
             </a:fld>
             <a:endParaRPr lang="zh-CN" altLang="en-US"/>
           </a:p>
@@ -2377,7 +2382,7 @@
           <a:p>
             <a:fld id="{5A97F598-E2C5-41F4-93C0-94E73E3AC985}" type="datetimeFigureOut">
               <a:rPr lang="zh-CN" altLang="en-US" smtClean="0"/>
-              <a:t>2021/11/25</a:t>
+              <a:t>2022/7/5</a:t>
             </a:fld>
             <a:endParaRPr lang="zh-CN" altLang="en-US"/>
           </a:p>
@@ -2665,7 +2670,7 @@
           <a:p>
             <a:fld id="{5A97F598-E2C5-41F4-93C0-94E73E3AC985}" type="datetimeFigureOut">
               <a:rPr lang="zh-CN" altLang="en-US" smtClean="0"/>
-              <a:t>2021/11/25</a:t>
+              <a:t>2022/7/5</a:t>
             </a:fld>
             <a:endParaRPr lang="zh-CN" altLang="en-US"/>
           </a:p>
@@ -2906,7 +2911,7 @@
           <a:p>
             <a:fld id="{5A97F598-E2C5-41F4-93C0-94E73E3AC985}" type="datetimeFigureOut">
               <a:rPr lang="zh-CN" altLang="en-US" smtClean="0"/>
-              <a:t>2021/11/25</a:t>
+              <a:t>2022/7/5</a:t>
             </a:fld>
             <a:endParaRPr lang="zh-CN" altLang="en-US"/>
           </a:p>
@@ -6642,12 +6647,666 @@
           <a:chExt cx="0" cy="0"/>
         </a:xfrm>
       </p:grpSpPr>
+      <p:grpSp>
+        <p:nvGrpSpPr>
+          <p:cNvPr id="2" name="组合 1">
+            <a:extLst>
+              <a:ext uri="{FF2B5EF4-FFF2-40B4-BE49-F238E27FC236}">
+                <a16:creationId xmlns:a16="http://schemas.microsoft.com/office/drawing/2014/main" id="{CE97D9AB-F41C-9E52-088D-4EF18F7FB522}"/>
+              </a:ext>
+            </a:extLst>
+          </p:cNvPr>
+          <p:cNvGrpSpPr/>
+          <p:nvPr/>
+        </p:nvGrpSpPr>
+        <p:grpSpPr>
+          <a:xfrm>
+            <a:off x="4480460" y="454378"/>
+            <a:ext cx="3679861" cy="1545344"/>
+            <a:chOff x="4480460" y="454378"/>
+            <a:chExt cx="3679861" cy="1545344"/>
+          </a:xfrm>
+        </p:grpSpPr>
+        <p:cxnSp>
+          <p:nvCxnSpPr>
+            <p:cNvPr id="30" name="直接箭头连接符 29">
+              <a:extLst>
+                <a:ext uri="{FF2B5EF4-FFF2-40B4-BE49-F238E27FC236}">
+                  <a16:creationId xmlns:a16="http://schemas.microsoft.com/office/drawing/2014/main" id="{C5429B55-6688-48E9-9750-FB2EADD301D2}"/>
+                </a:ext>
+              </a:extLst>
+            </p:cNvPr>
+            <p:cNvCxnSpPr>
+              <a:cxnSpLocks/>
+            </p:cNvCxnSpPr>
+            <p:nvPr/>
+          </p:nvCxnSpPr>
+          <p:spPr>
+            <a:xfrm flipH="1">
+              <a:off x="4480460" y="1699269"/>
+              <a:ext cx="1070661" cy="0"/>
+            </a:xfrm>
+            <a:prstGeom prst="straightConnector1">
+              <a:avLst/>
+            </a:prstGeom>
+            <a:ln w="19050">
+              <a:tailEnd type="triangle"/>
+            </a:ln>
+          </p:spPr>
+          <p:style>
+            <a:lnRef idx="1">
+              <a:schemeClr val="dk1"/>
+            </a:lnRef>
+            <a:fillRef idx="0">
+              <a:schemeClr val="dk1"/>
+            </a:fillRef>
+            <a:effectRef idx="0">
+              <a:schemeClr val="dk1"/>
+            </a:effectRef>
+            <a:fontRef idx="minor">
+              <a:schemeClr val="tx1"/>
+            </a:fontRef>
+          </p:style>
+        </p:cxnSp>
+        <p:cxnSp>
+          <p:nvCxnSpPr>
+            <p:cNvPr id="31" name="直接箭头连接符 30">
+              <a:extLst>
+                <a:ext uri="{FF2B5EF4-FFF2-40B4-BE49-F238E27FC236}">
+                  <a16:creationId xmlns:a16="http://schemas.microsoft.com/office/drawing/2014/main" id="{87A594E5-C54B-4BB2-9057-7384191F074D}"/>
+                </a:ext>
+              </a:extLst>
+            </p:cNvPr>
+            <p:cNvCxnSpPr>
+              <a:cxnSpLocks/>
+            </p:cNvCxnSpPr>
+            <p:nvPr/>
+          </p:nvCxnSpPr>
+          <p:spPr>
+            <a:xfrm flipV="1">
+              <a:off x="5563173" y="884100"/>
+              <a:ext cx="0" cy="825585"/>
+            </a:xfrm>
+            <a:prstGeom prst="straightConnector1">
+              <a:avLst/>
+            </a:prstGeom>
+            <a:ln w="19050">
+              <a:tailEnd type="triangle"/>
+            </a:ln>
+          </p:spPr>
+          <p:style>
+            <a:lnRef idx="1">
+              <a:schemeClr val="dk1"/>
+            </a:lnRef>
+            <a:fillRef idx="0">
+              <a:schemeClr val="dk1"/>
+            </a:fillRef>
+            <a:effectRef idx="0">
+              <a:schemeClr val="dk1"/>
+            </a:effectRef>
+            <a:fontRef idx="minor">
+              <a:schemeClr val="tx1"/>
+            </a:fontRef>
+          </p:style>
+        </p:cxnSp>
+        <p:cxnSp>
+          <p:nvCxnSpPr>
+            <p:cNvPr id="32" name="直接箭头连接符 31">
+              <a:extLst>
+                <a:ext uri="{FF2B5EF4-FFF2-40B4-BE49-F238E27FC236}">
+                  <a16:creationId xmlns:a16="http://schemas.microsoft.com/office/drawing/2014/main" id="{1F9386F7-00A8-44B4-B9BC-CC8C25DF6900}"/>
+                </a:ext>
+              </a:extLst>
+            </p:cNvPr>
+            <p:cNvCxnSpPr>
+              <a:cxnSpLocks/>
+            </p:cNvCxnSpPr>
+            <p:nvPr/>
+          </p:nvCxnSpPr>
+          <p:spPr>
+            <a:xfrm flipH="1">
+              <a:off x="5563256" y="1699269"/>
+              <a:ext cx="2597065" cy="0"/>
+            </a:xfrm>
+            <a:prstGeom prst="straightConnector1">
+              <a:avLst/>
+            </a:prstGeom>
+            <a:ln w="19050">
+              <a:prstDash val="dash"/>
+              <a:headEnd type="none" w="med" len="med"/>
+              <a:tailEnd type="none" w="med" len="med"/>
+            </a:ln>
+          </p:spPr>
+          <p:style>
+            <a:lnRef idx="1">
+              <a:schemeClr val="dk1"/>
+            </a:lnRef>
+            <a:fillRef idx="0">
+              <a:schemeClr val="dk1"/>
+            </a:fillRef>
+            <a:effectRef idx="0">
+              <a:schemeClr val="dk1"/>
+            </a:effectRef>
+            <a:fontRef idx="minor">
+              <a:schemeClr val="tx1"/>
+            </a:fontRef>
+          </p:style>
+        </p:cxnSp>
+        <p:cxnSp>
+          <p:nvCxnSpPr>
+            <p:cNvPr id="33" name="直接连接符 32">
+              <a:extLst>
+                <a:ext uri="{FF2B5EF4-FFF2-40B4-BE49-F238E27FC236}">
+                  <a16:creationId xmlns:a16="http://schemas.microsoft.com/office/drawing/2014/main" id="{204B3F26-2620-41CD-A27F-CF3FC0FFEF3F}"/>
+                </a:ext>
+              </a:extLst>
+            </p:cNvPr>
+            <p:cNvCxnSpPr>
+              <a:cxnSpLocks/>
+            </p:cNvCxnSpPr>
+            <p:nvPr/>
+          </p:nvCxnSpPr>
+          <p:spPr>
+            <a:xfrm flipV="1">
+              <a:off x="5563173" y="636084"/>
+              <a:ext cx="2257718" cy="1063185"/>
+            </a:xfrm>
+            <a:prstGeom prst="line">
+              <a:avLst/>
+            </a:prstGeom>
+            <a:ln/>
+          </p:spPr>
+          <p:style>
+            <a:lnRef idx="3">
+              <a:schemeClr val="accent2"/>
+            </a:lnRef>
+            <a:fillRef idx="0">
+              <a:schemeClr val="accent2"/>
+            </a:fillRef>
+            <a:effectRef idx="2">
+              <a:schemeClr val="accent2"/>
+            </a:effectRef>
+            <a:fontRef idx="minor">
+              <a:schemeClr val="tx1"/>
+            </a:fontRef>
+          </p:style>
+        </p:cxnSp>
+        <p:cxnSp>
+          <p:nvCxnSpPr>
+            <p:cNvPr id="34" name="直接连接符 33">
+              <a:extLst>
+                <a:ext uri="{FF2B5EF4-FFF2-40B4-BE49-F238E27FC236}">
+                  <a16:creationId xmlns:a16="http://schemas.microsoft.com/office/drawing/2014/main" id="{836923C8-59DA-4C62-82CE-5484637F1B22}"/>
+                </a:ext>
+              </a:extLst>
+            </p:cNvPr>
+            <p:cNvCxnSpPr>
+              <a:cxnSpLocks/>
+            </p:cNvCxnSpPr>
+            <p:nvPr/>
+          </p:nvCxnSpPr>
+          <p:spPr>
+            <a:xfrm>
+              <a:off x="7453743" y="828587"/>
+              <a:ext cx="0" cy="881098"/>
+            </a:xfrm>
+            <a:prstGeom prst="line">
+              <a:avLst/>
+            </a:prstGeom>
+            <a:ln>
+              <a:solidFill>
+                <a:srgbClr val="FF0000"/>
+              </a:solidFill>
+            </a:ln>
+          </p:spPr>
+          <p:style>
+            <a:lnRef idx="2">
+              <a:schemeClr val="accent2"/>
+            </a:lnRef>
+            <a:fillRef idx="0">
+              <a:schemeClr val="accent2"/>
+            </a:fillRef>
+            <a:effectRef idx="1">
+              <a:schemeClr val="accent2"/>
+            </a:effectRef>
+            <a:fontRef idx="minor">
+              <a:schemeClr val="tx1"/>
+            </a:fontRef>
+          </p:style>
+        </p:cxnSp>
+        <p:cxnSp>
+          <p:nvCxnSpPr>
+            <p:cNvPr id="35" name="直接连接符 34">
+              <a:extLst>
+                <a:ext uri="{FF2B5EF4-FFF2-40B4-BE49-F238E27FC236}">
+                  <a16:creationId xmlns:a16="http://schemas.microsoft.com/office/drawing/2014/main" id="{544A0D9E-DF3E-4AAB-BFF2-D3999B5E04AF}"/>
+                </a:ext>
+              </a:extLst>
+            </p:cNvPr>
+            <p:cNvCxnSpPr>
+              <a:cxnSpLocks/>
+            </p:cNvCxnSpPr>
+            <p:nvPr/>
+          </p:nvCxnSpPr>
+          <p:spPr>
+            <a:xfrm>
+              <a:off x="6823359" y="1071226"/>
+              <a:ext cx="0" cy="648828"/>
+            </a:xfrm>
+            <a:prstGeom prst="line">
+              <a:avLst/>
+            </a:prstGeom>
+          </p:spPr>
+          <p:style>
+            <a:lnRef idx="2">
+              <a:schemeClr val="accent2"/>
+            </a:lnRef>
+            <a:fillRef idx="0">
+              <a:schemeClr val="accent2"/>
+            </a:fillRef>
+            <a:effectRef idx="1">
+              <a:schemeClr val="accent2"/>
+            </a:effectRef>
+            <a:fontRef idx="minor">
+              <a:schemeClr val="tx1"/>
+            </a:fontRef>
+          </p:style>
+        </p:cxnSp>
+        <p:sp>
+          <p:nvSpPr>
+            <p:cNvPr id="36" name="文本框 35">
+              <a:extLst>
+                <a:ext uri="{FF2B5EF4-FFF2-40B4-BE49-F238E27FC236}">
+                  <a16:creationId xmlns:a16="http://schemas.microsoft.com/office/drawing/2014/main" id="{45732CC4-6C67-4047-BC7C-6FE65F644F60}"/>
+                </a:ext>
+              </a:extLst>
+            </p:cNvPr>
+            <p:cNvSpPr txBox="1"/>
+            <p:nvPr/>
+          </p:nvSpPr>
+          <p:spPr>
+            <a:xfrm>
+              <a:off x="6666906" y="1621130"/>
+              <a:ext cx="389850" cy="369332"/>
+            </a:xfrm>
+            <a:prstGeom prst="rect">
+              <a:avLst/>
+            </a:prstGeom>
+            <a:noFill/>
+          </p:spPr>
+          <p:txBody>
+            <a:bodyPr wrap="none" rtlCol="0">
+              <a:spAutoFit/>
+            </a:bodyPr>
+            <a:lstStyle/>
+            <a:p>
+              <a:r>
+                <a:rPr lang="en-US" altLang="zh-CN" dirty="0">
+                  <a:latin typeface="Arial" panose="020B0604020202020204" pitchFamily="34" charset="0"/>
+                  <a:cs typeface="Arial" panose="020B0604020202020204" pitchFamily="34" charset="0"/>
+                </a:rPr>
+                <a:t>-n</a:t>
+              </a:r>
+              <a:endParaRPr lang="zh-CN" altLang="en-US" dirty="0"/>
+            </a:p>
+          </p:txBody>
+        </p:sp>
+        <p:sp>
+          <p:nvSpPr>
+            <p:cNvPr id="38" name="文本框 37">
+              <a:extLst>
+                <a:ext uri="{FF2B5EF4-FFF2-40B4-BE49-F238E27FC236}">
+                  <a16:creationId xmlns:a16="http://schemas.microsoft.com/office/drawing/2014/main" id="{29654433-E8ED-4F18-AFEA-15C8B6586E46}"/>
+                </a:ext>
+              </a:extLst>
+            </p:cNvPr>
+            <p:cNvSpPr txBox="1"/>
+            <p:nvPr/>
+          </p:nvSpPr>
+          <p:spPr>
+            <a:xfrm>
+              <a:off x="5357398" y="916767"/>
+              <a:ext cx="222422" cy="308919"/>
+            </a:xfrm>
+            <a:prstGeom prst="rect">
+              <a:avLst/>
+            </a:prstGeom>
+            <a:noFill/>
+          </p:spPr>
+          <p:txBody>
+            <a:bodyPr wrap="square" rtlCol="0">
+              <a:spAutoFit/>
+            </a:bodyPr>
+            <a:lstStyle>
+              <a:defPPr>
+                <a:defRPr lang="zh-CN"/>
+              </a:defPPr>
+              <a:lvl1pPr>
+                <a:defRPr sz="1400">
+                  <a:latin typeface="Arial" panose="020B0604020202020204" pitchFamily="34" charset="0"/>
+                  <a:cs typeface="Arial" panose="020B0604020202020204" pitchFamily="34" charset="0"/>
+                </a:defRPr>
+              </a:lvl1pPr>
+            </a:lstStyle>
+            <a:p>
+              <a:r>
+                <a:rPr lang="en-US" altLang="zh-CN" dirty="0"/>
+                <a:t>y</a:t>
+              </a:r>
+              <a:endParaRPr lang="zh-CN" altLang="en-US" dirty="0"/>
+            </a:p>
+          </p:txBody>
+        </p:sp>
+        <p:sp>
+          <p:nvSpPr>
+            <p:cNvPr id="39" name="文本框 38">
+              <a:extLst>
+                <a:ext uri="{FF2B5EF4-FFF2-40B4-BE49-F238E27FC236}">
+                  <a16:creationId xmlns:a16="http://schemas.microsoft.com/office/drawing/2014/main" id="{6D4C9AF7-2741-4576-BCCF-249B47BED926}"/>
+                </a:ext>
+              </a:extLst>
+            </p:cNvPr>
+            <p:cNvSpPr txBox="1"/>
+            <p:nvPr/>
+          </p:nvSpPr>
+          <p:spPr>
+            <a:xfrm>
+              <a:off x="4611702" y="1455005"/>
+              <a:ext cx="222422" cy="308919"/>
+            </a:xfrm>
+            <a:prstGeom prst="rect">
+              <a:avLst/>
+            </a:prstGeom>
+            <a:noFill/>
+          </p:spPr>
+          <p:txBody>
+            <a:bodyPr wrap="square" rtlCol="0">
+              <a:spAutoFit/>
+            </a:bodyPr>
+            <a:lstStyle>
+              <a:defPPr>
+                <a:defRPr lang="zh-CN"/>
+              </a:defPPr>
+              <a:lvl1pPr>
+                <a:defRPr sz="1400">
+                  <a:latin typeface="Arial" panose="020B0604020202020204" pitchFamily="34" charset="0"/>
+                  <a:cs typeface="Arial" panose="020B0604020202020204" pitchFamily="34" charset="0"/>
+                </a:defRPr>
+              </a:lvl1pPr>
+            </a:lstStyle>
+            <a:p>
+              <a:r>
+                <a:rPr lang="en-US" altLang="zh-CN" dirty="0"/>
+                <a:t>z</a:t>
+              </a:r>
+              <a:endParaRPr lang="zh-CN" altLang="en-US" dirty="0"/>
+            </a:p>
+          </p:txBody>
+        </p:sp>
+        <p:sp>
+          <p:nvSpPr>
+            <p:cNvPr id="40" name="文本框 39">
+              <a:extLst>
+                <a:ext uri="{FF2B5EF4-FFF2-40B4-BE49-F238E27FC236}">
+                  <a16:creationId xmlns:a16="http://schemas.microsoft.com/office/drawing/2014/main" id="{9AAA363C-306B-4993-AE15-FD4EA3D9B1E5}"/>
+                </a:ext>
+              </a:extLst>
+            </p:cNvPr>
+            <p:cNvSpPr txBox="1"/>
+            <p:nvPr/>
+          </p:nvSpPr>
+          <p:spPr>
+            <a:xfrm>
+              <a:off x="7124422" y="454378"/>
+              <a:ext cx="658642" cy="307777"/>
+            </a:xfrm>
+            <a:prstGeom prst="rect">
+              <a:avLst/>
+            </a:prstGeom>
+            <a:noFill/>
+          </p:spPr>
+          <p:txBody>
+            <a:bodyPr wrap="none" rtlCol="0">
+              <a:spAutoFit/>
+            </a:bodyPr>
+            <a:lstStyle/>
+            <a:p>
+              <a:r>
+                <a:rPr lang="en-US" altLang="zh-CN" sz="1400" dirty="0">
+                  <a:latin typeface="Arial" panose="020B0604020202020204" pitchFamily="34" charset="0"/>
+                  <a:cs typeface="Arial" panose="020B0604020202020204" pitchFamily="34" charset="0"/>
+                </a:rPr>
+                <a:t>(</a:t>
+              </a:r>
+              <a:r>
+                <a:rPr lang="en-US" altLang="zh-CN" sz="1400" dirty="0" err="1">
+                  <a:latin typeface="Arial" panose="020B0604020202020204" pitchFamily="34" charset="0"/>
+                  <a:cs typeface="Arial" panose="020B0604020202020204" pitchFamily="34" charset="0"/>
+                </a:rPr>
+                <a:t>x,y,z</a:t>
+              </a:r>
+              <a:r>
+                <a:rPr lang="en-US" altLang="zh-CN" sz="1400" dirty="0">
+                  <a:latin typeface="Arial" panose="020B0604020202020204" pitchFamily="34" charset="0"/>
+                  <a:cs typeface="Arial" panose="020B0604020202020204" pitchFamily="34" charset="0"/>
+                </a:rPr>
+                <a:t>)</a:t>
+              </a:r>
+              <a:endParaRPr lang="zh-CN" altLang="en-US" sz="1400" dirty="0">
+                <a:latin typeface="Arial" panose="020B0604020202020204" pitchFamily="34" charset="0"/>
+                <a:cs typeface="Arial" panose="020B0604020202020204" pitchFamily="34" charset="0"/>
+              </a:endParaRPr>
+            </a:p>
+          </p:txBody>
+        </p:sp>
+        <p:sp>
+          <p:nvSpPr>
+            <p:cNvPr id="41" name="椭圆 40">
+              <a:extLst>
+                <a:ext uri="{FF2B5EF4-FFF2-40B4-BE49-F238E27FC236}">
+                  <a16:creationId xmlns:a16="http://schemas.microsoft.com/office/drawing/2014/main" id="{119FDB8A-2AD6-4838-9EDF-B5EBE8A075DB}"/>
+                </a:ext>
+              </a:extLst>
+            </p:cNvPr>
+            <p:cNvSpPr/>
+            <p:nvPr/>
+          </p:nvSpPr>
+          <p:spPr>
+            <a:xfrm>
+              <a:off x="7419108" y="784299"/>
+              <a:ext cx="72000" cy="72000"/>
+            </a:xfrm>
+            <a:prstGeom prst="ellipse">
+              <a:avLst/>
+            </a:prstGeom>
+            <a:solidFill>
+              <a:srgbClr val="FF0000"/>
+            </a:solidFill>
+            <a:ln>
+              <a:noFill/>
+            </a:ln>
+          </p:spPr>
+          <p:style>
+            <a:lnRef idx="2">
+              <a:schemeClr val="accent1">
+                <a:shade val="50000"/>
+              </a:schemeClr>
+            </a:lnRef>
+            <a:fillRef idx="1">
+              <a:schemeClr val="accent1"/>
+            </a:fillRef>
+            <a:effectRef idx="0">
+              <a:schemeClr val="accent1"/>
+            </a:effectRef>
+            <a:fontRef idx="minor">
+              <a:schemeClr val="lt1"/>
+            </a:fontRef>
+          </p:style>
+          <p:txBody>
+            <a:bodyPr rtlCol="0" anchor="ctr"/>
+            <a:lstStyle/>
+            <a:p>
+              <a:pPr algn="ctr"/>
+              <a:endParaRPr lang="zh-CN" altLang="en-US"/>
+            </a:p>
+          </p:txBody>
+        </p:sp>
+        <p:sp>
+          <p:nvSpPr>
+            <p:cNvPr id="43" name="文本框 42">
+              <a:extLst>
+                <a:ext uri="{FF2B5EF4-FFF2-40B4-BE49-F238E27FC236}">
+                  <a16:creationId xmlns:a16="http://schemas.microsoft.com/office/drawing/2014/main" id="{954042DA-0662-4E1F-B8BF-FB258C6A49F2}"/>
+                </a:ext>
+              </a:extLst>
+            </p:cNvPr>
+            <p:cNvSpPr txBox="1"/>
+            <p:nvPr/>
+          </p:nvSpPr>
+          <p:spPr>
+            <a:xfrm>
+              <a:off x="7297290" y="1630390"/>
+              <a:ext cx="300082" cy="369332"/>
+            </a:xfrm>
+            <a:prstGeom prst="rect">
+              <a:avLst/>
+            </a:prstGeom>
+            <a:noFill/>
+          </p:spPr>
+          <p:txBody>
+            <a:bodyPr wrap="none" rtlCol="0">
+              <a:spAutoFit/>
+            </a:bodyPr>
+            <a:lstStyle/>
+            <a:p>
+              <a:r>
+                <a:rPr lang="en-US" altLang="zh-CN" dirty="0">
+                  <a:latin typeface="Arial" panose="020B0604020202020204" pitchFamily="34" charset="0"/>
+                  <a:cs typeface="Arial" panose="020B0604020202020204" pitchFamily="34" charset="0"/>
+                </a:rPr>
+                <a:t>z</a:t>
+              </a:r>
+              <a:endParaRPr lang="zh-CN" altLang="en-US" dirty="0"/>
+            </a:p>
+          </p:txBody>
+        </p:sp>
+        <p:sp>
+          <p:nvSpPr>
+            <p:cNvPr id="50" name="椭圆 49">
+              <a:extLst>
+                <a:ext uri="{FF2B5EF4-FFF2-40B4-BE49-F238E27FC236}">
+                  <a16:creationId xmlns:a16="http://schemas.microsoft.com/office/drawing/2014/main" id="{98E19814-6C27-406A-B466-46DD7AA4E5C4}"/>
+                </a:ext>
+              </a:extLst>
+            </p:cNvPr>
+            <p:cNvSpPr/>
+            <p:nvPr/>
+          </p:nvSpPr>
+          <p:spPr>
+            <a:xfrm>
+              <a:off x="6788730" y="1089096"/>
+              <a:ext cx="72000" cy="72000"/>
+            </a:xfrm>
+            <a:prstGeom prst="ellipse">
+              <a:avLst/>
+            </a:prstGeom>
+            <a:solidFill>
+              <a:srgbClr val="FFC000"/>
+            </a:solidFill>
+            <a:ln>
+              <a:solidFill>
+                <a:srgbClr val="FFC000"/>
+              </a:solidFill>
+            </a:ln>
+          </p:spPr>
+          <p:style>
+            <a:lnRef idx="2">
+              <a:schemeClr val="accent1">
+                <a:shade val="50000"/>
+              </a:schemeClr>
+            </a:lnRef>
+            <a:fillRef idx="1">
+              <a:schemeClr val="accent1"/>
+            </a:fillRef>
+            <a:effectRef idx="0">
+              <a:schemeClr val="accent1"/>
+            </a:effectRef>
+            <a:fontRef idx="minor">
+              <a:schemeClr val="lt1"/>
+            </a:fontRef>
+          </p:style>
+          <p:txBody>
+            <a:bodyPr rtlCol="0" anchor="ctr"/>
+            <a:lstStyle/>
+            <a:p>
+              <a:pPr algn="ctr"/>
+              <a:endParaRPr lang="zh-CN" altLang="en-US"/>
+            </a:p>
+          </p:txBody>
+        </p:sp>
+        <p:sp>
+          <p:nvSpPr>
+            <p:cNvPr id="51" name="文本框 50">
+              <a:extLst>
+                <a:ext uri="{FF2B5EF4-FFF2-40B4-BE49-F238E27FC236}">
+                  <a16:creationId xmlns:a16="http://schemas.microsoft.com/office/drawing/2014/main" id="{6AA91E26-DB99-4EC0-B146-72284774BE35}"/>
+                </a:ext>
+              </a:extLst>
+            </p:cNvPr>
+            <p:cNvSpPr txBox="1"/>
+            <p:nvPr/>
+          </p:nvSpPr>
+          <p:spPr>
+            <a:xfrm>
+              <a:off x="6434889" y="772384"/>
+              <a:ext cx="785793" cy="307777"/>
+            </a:xfrm>
+            <a:prstGeom prst="rect">
+              <a:avLst/>
+            </a:prstGeom>
+            <a:noFill/>
+          </p:spPr>
+          <p:txBody>
+            <a:bodyPr wrap="none" rtlCol="0">
+              <a:spAutoFit/>
+            </a:bodyPr>
+            <a:lstStyle/>
+            <a:p>
+              <a:r>
+                <a:rPr lang="en-US" altLang="zh-CN" sz="1400" dirty="0">
+                  <a:latin typeface="Arial" panose="020B0604020202020204" pitchFamily="34" charset="0"/>
+                  <a:cs typeface="Arial" panose="020B0604020202020204" pitchFamily="34" charset="0"/>
+                </a:rPr>
+                <a:t>(</a:t>
+              </a:r>
+              <a:r>
+                <a:rPr lang="en-US" altLang="zh-CN" sz="1400" dirty="0" err="1">
+                  <a:latin typeface="Arial" panose="020B0604020202020204" pitchFamily="34" charset="0"/>
+                  <a:cs typeface="Arial" panose="020B0604020202020204" pitchFamily="34" charset="0"/>
+                </a:rPr>
+                <a:t>x’,y’,z</a:t>
+              </a:r>
+              <a:r>
+                <a:rPr lang="en-US" altLang="zh-CN" sz="1400" dirty="0">
+                  <a:latin typeface="Arial" panose="020B0604020202020204" pitchFamily="34" charset="0"/>
+                  <a:cs typeface="Arial" panose="020B0604020202020204" pitchFamily="34" charset="0"/>
+                </a:rPr>
+                <a:t>’)</a:t>
+              </a:r>
+              <a:endParaRPr lang="zh-CN" altLang="en-US" sz="1400" dirty="0">
+                <a:latin typeface="Arial" panose="020B0604020202020204" pitchFamily="34" charset="0"/>
+                <a:cs typeface="Arial" panose="020B0604020202020204" pitchFamily="34" charset="0"/>
+              </a:endParaRPr>
+            </a:p>
+          </p:txBody>
+        </p:sp>
+      </p:grpSp>
       <p:cxnSp>
         <p:nvCxnSpPr>
-          <p:cNvPr id="30" name="直接箭头连接符 29">
-            <a:extLst>
-              <a:ext uri="{FF2B5EF4-FFF2-40B4-BE49-F238E27FC236}">
-                <a16:creationId xmlns:a16="http://schemas.microsoft.com/office/drawing/2014/main" id="{C5429B55-6688-48E9-9750-FB2EADD301D2}"/>
+          <p:cNvPr id="17" name="直接箭头连接符 16">
+            <a:extLst>
+              <a:ext uri="{FF2B5EF4-FFF2-40B4-BE49-F238E27FC236}">
+                <a16:creationId xmlns:a16="http://schemas.microsoft.com/office/drawing/2014/main" id="{9126BC5B-22A8-7C29-6529-37A3ABACBE10}"/>
               </a:ext>
             </a:extLst>
           </p:cNvPr>
@@ -6658,7 +7317,7 @@
         </p:nvCxnSpPr>
         <p:spPr>
           <a:xfrm flipH="1">
-            <a:off x="4480460" y="3346438"/>
+            <a:off x="3617429" y="4894651"/>
             <a:ext cx="1070661" cy="0"/>
           </a:xfrm>
           <a:prstGeom prst="straightConnector1">
@@ -6685,10 +7344,10 @@
       </p:cxnSp>
       <p:cxnSp>
         <p:nvCxnSpPr>
-          <p:cNvPr id="31" name="直接箭头连接符 30">
-            <a:extLst>
-              <a:ext uri="{FF2B5EF4-FFF2-40B4-BE49-F238E27FC236}">
-                <a16:creationId xmlns:a16="http://schemas.microsoft.com/office/drawing/2014/main" id="{87A594E5-C54B-4BB2-9057-7384191F074D}"/>
+          <p:cNvPr id="18" name="直接箭头连接符 17">
+            <a:extLst>
+              <a:ext uri="{FF2B5EF4-FFF2-40B4-BE49-F238E27FC236}">
+                <a16:creationId xmlns:a16="http://schemas.microsoft.com/office/drawing/2014/main" id="{1877C28C-B1A6-FD74-83A8-752F6C6CDD1E}"/>
               </a:ext>
             </a:extLst>
           </p:cNvPr>
@@ -6699,7 +7358,7 @@
         </p:nvCxnSpPr>
         <p:spPr>
           <a:xfrm flipV="1">
-            <a:off x="5563173" y="2531269"/>
+            <a:off x="4700142" y="4079482"/>
             <a:ext cx="0" cy="825585"/>
           </a:xfrm>
           <a:prstGeom prst="straightConnector1">
@@ -6726,10 +7385,10 @@
       </p:cxnSp>
       <p:cxnSp>
         <p:nvCxnSpPr>
-          <p:cNvPr id="32" name="直接箭头连接符 31">
-            <a:extLst>
-              <a:ext uri="{FF2B5EF4-FFF2-40B4-BE49-F238E27FC236}">
-                <a16:creationId xmlns:a16="http://schemas.microsoft.com/office/drawing/2014/main" id="{1F9386F7-00A8-44B4-B9BC-CC8C25DF6900}"/>
+          <p:cNvPr id="19" name="直接箭头连接符 18">
+            <a:extLst>
+              <a:ext uri="{FF2B5EF4-FFF2-40B4-BE49-F238E27FC236}">
+                <a16:creationId xmlns:a16="http://schemas.microsoft.com/office/drawing/2014/main" id="{CED12550-6D15-FEA9-30DD-6B1C6ABE7F98}"/>
               </a:ext>
             </a:extLst>
           </p:cNvPr>
@@ -6740,7 +7399,7 @@
         </p:nvCxnSpPr>
         <p:spPr>
           <a:xfrm flipH="1">
-            <a:off x="5563256" y="3346438"/>
+            <a:off x="4700225" y="4894651"/>
             <a:ext cx="2597065" cy="0"/>
           </a:xfrm>
           <a:prstGeom prst="straightConnector1">
@@ -6769,22 +7428,20 @@
       </p:cxnSp>
       <p:cxnSp>
         <p:nvCxnSpPr>
-          <p:cNvPr id="33" name="直接连接符 32">
-            <a:extLst>
-              <a:ext uri="{FF2B5EF4-FFF2-40B4-BE49-F238E27FC236}">
-                <a16:creationId xmlns:a16="http://schemas.microsoft.com/office/drawing/2014/main" id="{204B3F26-2620-41CD-A27F-CF3FC0FFEF3F}"/>
-              </a:ext>
-            </a:extLst>
-          </p:cNvPr>
-          <p:cNvCxnSpPr>
-            <a:cxnSpLocks/>
-          </p:cNvCxnSpPr>
+          <p:cNvPr id="20" name="直接连接符 19">
+            <a:extLst>
+              <a:ext uri="{FF2B5EF4-FFF2-40B4-BE49-F238E27FC236}">
+                <a16:creationId xmlns:a16="http://schemas.microsoft.com/office/drawing/2014/main" id="{BF2B0653-B12A-EEE3-826B-C80154B1DEB5}"/>
+              </a:ext>
+            </a:extLst>
+          </p:cNvPr>
+          <p:cNvCxnSpPr/>
           <p:nvPr/>
         </p:nvCxnSpPr>
         <p:spPr>
           <a:xfrm flipV="1">
-            <a:off x="5563173" y="2283253"/>
-            <a:ext cx="2257718" cy="1063185"/>
+            <a:off x="4700142" y="3680129"/>
+            <a:ext cx="2243857" cy="1214522"/>
           </a:xfrm>
           <a:prstGeom prst="line">
             <a:avLst/>
@@ -6808,10 +7465,10 @@
       </p:cxnSp>
       <p:cxnSp>
         <p:nvCxnSpPr>
-          <p:cNvPr id="34" name="直接连接符 33">
-            <a:extLst>
-              <a:ext uri="{FF2B5EF4-FFF2-40B4-BE49-F238E27FC236}">
-                <a16:creationId xmlns:a16="http://schemas.microsoft.com/office/drawing/2014/main" id="{836923C8-59DA-4C62-82CE-5484637F1B22}"/>
+          <p:cNvPr id="21" name="直接连接符 20">
+            <a:extLst>
+              <a:ext uri="{FF2B5EF4-FFF2-40B4-BE49-F238E27FC236}">
+                <a16:creationId xmlns:a16="http://schemas.microsoft.com/office/drawing/2014/main" id="{74E36FAB-DD93-4DC4-DC5B-B0204973D6A8}"/>
               </a:ext>
             </a:extLst>
           </p:cNvPr>
@@ -6822,51 +7479,8 @@
         </p:nvCxnSpPr>
         <p:spPr>
           <a:xfrm>
-            <a:off x="7453743" y="2475756"/>
-            <a:ext cx="0" cy="881098"/>
-          </a:xfrm>
-          <a:prstGeom prst="line">
-            <a:avLst/>
-          </a:prstGeom>
-          <a:ln>
-            <a:solidFill>
-              <a:srgbClr val="FF0000"/>
-            </a:solidFill>
-          </a:ln>
-        </p:spPr>
-        <p:style>
-          <a:lnRef idx="2">
-            <a:schemeClr val="accent2"/>
-          </a:lnRef>
-          <a:fillRef idx="0">
-            <a:schemeClr val="accent2"/>
-          </a:fillRef>
-          <a:effectRef idx="1">
-            <a:schemeClr val="accent2"/>
-          </a:effectRef>
-          <a:fontRef idx="minor">
-            <a:schemeClr val="tx1"/>
-          </a:fontRef>
-        </p:style>
-      </p:cxnSp>
-      <p:cxnSp>
-        <p:nvCxnSpPr>
-          <p:cNvPr id="35" name="直接连接符 34">
-            <a:extLst>
-              <a:ext uri="{FF2B5EF4-FFF2-40B4-BE49-F238E27FC236}">
-                <a16:creationId xmlns:a16="http://schemas.microsoft.com/office/drawing/2014/main" id="{544A0D9E-DF3E-4AAB-BFF2-D3999B5E04AF}"/>
-              </a:ext>
-            </a:extLst>
-          </p:cNvPr>
-          <p:cNvCxnSpPr>
-            <a:cxnSpLocks/>
-          </p:cNvCxnSpPr>
-          <p:nvPr/>
-        </p:nvCxnSpPr>
-        <p:spPr>
-          <a:xfrm>
-            <a:off x="6823359" y="2718395"/>
-            <a:ext cx="0" cy="648828"/>
+            <a:off x="6943999" y="3680129"/>
+            <a:ext cx="0" cy="1214522"/>
           </a:xfrm>
           <a:prstGeom prst="line">
             <a:avLst/>
@@ -6887,12 +7501,50 @@
           </a:fontRef>
         </p:style>
       </p:cxnSp>
-      <p:sp>
-        <p:nvSpPr>
-          <p:cNvPr id="36" name="文本框 35">
-            <a:extLst>
-              <a:ext uri="{FF2B5EF4-FFF2-40B4-BE49-F238E27FC236}">
-                <a16:creationId xmlns:a16="http://schemas.microsoft.com/office/drawing/2014/main" id="{45732CC4-6C67-4047-BC7C-6FE65F644F60}"/>
+      <p:cxnSp>
+        <p:nvCxnSpPr>
+          <p:cNvPr id="22" name="直接连接符 21">
+            <a:extLst>
+              <a:ext uri="{FF2B5EF4-FFF2-40B4-BE49-F238E27FC236}">
+                <a16:creationId xmlns:a16="http://schemas.microsoft.com/office/drawing/2014/main" id="{DA6F1ADB-FE9F-BB3E-7C37-A0F2CF1643EE}"/>
+              </a:ext>
+            </a:extLst>
+          </p:cNvPr>
+          <p:cNvCxnSpPr>
+            <a:cxnSpLocks/>
+          </p:cNvCxnSpPr>
+          <p:nvPr/>
+        </p:nvCxnSpPr>
+        <p:spPr>
+          <a:xfrm>
+            <a:off x="5960328" y="4229069"/>
+            <a:ext cx="0" cy="686367"/>
+          </a:xfrm>
+          <a:prstGeom prst="line">
+            <a:avLst/>
+          </a:prstGeom>
+        </p:spPr>
+        <p:style>
+          <a:lnRef idx="2">
+            <a:schemeClr val="accent2"/>
+          </a:lnRef>
+          <a:fillRef idx="0">
+            <a:schemeClr val="accent2"/>
+          </a:fillRef>
+          <a:effectRef idx="1">
+            <a:schemeClr val="accent2"/>
+          </a:effectRef>
+          <a:fontRef idx="minor">
+            <a:schemeClr val="tx1"/>
+          </a:fontRef>
+        </p:style>
+      </p:cxnSp>
+      <p:sp>
+        <p:nvSpPr>
+          <p:cNvPr id="23" name="文本框 22">
+            <a:extLst>
+              <a:ext uri="{FF2B5EF4-FFF2-40B4-BE49-F238E27FC236}">
+                <a16:creationId xmlns:a16="http://schemas.microsoft.com/office/drawing/2014/main" id="{9A4648B7-E224-5572-0F03-310B3F81AB46}"/>
               </a:ext>
             </a:extLst>
           </p:cNvPr>
@@ -6901,7 +7553,7 @@
         </p:nvSpPr>
         <p:spPr>
           <a:xfrm>
-            <a:off x="6666906" y="3268299"/>
+            <a:off x="5803875" y="4816512"/>
             <a:ext cx="389850" cy="369332"/>
           </a:xfrm>
           <a:prstGeom prst="rect">
@@ -6928,10 +7580,10 @@
       </p:sp>
       <p:sp>
         <p:nvSpPr>
-          <p:cNvPr id="38" name="文本框 37">
-            <a:extLst>
-              <a:ext uri="{FF2B5EF4-FFF2-40B4-BE49-F238E27FC236}">
-                <a16:creationId xmlns:a16="http://schemas.microsoft.com/office/drawing/2014/main" id="{29654433-E8ED-4F18-AFEA-15C8B6586E46}"/>
+          <p:cNvPr id="24" name="文本框 23">
+            <a:extLst>
+              <a:ext uri="{FF2B5EF4-FFF2-40B4-BE49-F238E27FC236}">
+                <a16:creationId xmlns:a16="http://schemas.microsoft.com/office/drawing/2014/main" id="{D16AE79F-B245-3BDB-C488-61B9E89D0D0F}"/>
               </a:ext>
             </a:extLst>
           </p:cNvPr>
@@ -6940,7 +7592,46 @@
         </p:nvSpPr>
         <p:spPr>
           <a:xfrm>
-            <a:off x="5357398" y="2563936"/>
+            <a:off x="6764413" y="4858278"/>
+            <a:ext cx="346362" cy="369332"/>
+          </a:xfrm>
+          <a:prstGeom prst="rect">
+            <a:avLst/>
+          </a:prstGeom>
+          <a:noFill/>
+        </p:spPr>
+        <p:txBody>
+          <a:bodyPr wrap="square" rtlCol="0">
+            <a:spAutoFit/>
+          </a:bodyPr>
+          <a:lstStyle/>
+          <a:p>
+            <a:r>
+              <a:rPr lang="en-US" altLang="zh-CN" dirty="0">
+                <a:latin typeface="Arial" panose="020B0604020202020204" pitchFamily="34" charset="0"/>
+                <a:cs typeface="Arial" panose="020B0604020202020204" pitchFamily="34" charset="0"/>
+              </a:rPr>
+              <a:t>-f</a:t>
+            </a:r>
+            <a:endParaRPr lang="zh-CN" altLang="en-US" dirty="0"/>
+          </a:p>
+        </p:txBody>
+      </p:sp>
+      <p:sp>
+        <p:nvSpPr>
+          <p:cNvPr id="25" name="文本框 24">
+            <a:extLst>
+              <a:ext uri="{FF2B5EF4-FFF2-40B4-BE49-F238E27FC236}">
+                <a16:creationId xmlns:a16="http://schemas.microsoft.com/office/drawing/2014/main" id="{3A1BE87A-0EB4-6335-992C-91B98D64FEB1}"/>
+              </a:ext>
+            </a:extLst>
+          </p:cNvPr>
+          <p:cNvSpPr txBox="1"/>
+          <p:nvPr/>
+        </p:nvSpPr>
+        <p:spPr>
+          <a:xfrm>
+            <a:off x="4494367" y="4112149"/>
             <a:ext cx="222422" cy="308919"/>
           </a:xfrm>
           <a:prstGeom prst="rect">
@@ -6974,10 +7665,10 @@
       </p:sp>
       <p:sp>
         <p:nvSpPr>
-          <p:cNvPr id="39" name="文本框 38">
-            <a:extLst>
-              <a:ext uri="{FF2B5EF4-FFF2-40B4-BE49-F238E27FC236}">
-                <a16:creationId xmlns:a16="http://schemas.microsoft.com/office/drawing/2014/main" id="{6D4C9AF7-2741-4576-BCCF-249B47BED926}"/>
+          <p:cNvPr id="26" name="文本框 25">
+            <a:extLst>
+              <a:ext uri="{FF2B5EF4-FFF2-40B4-BE49-F238E27FC236}">
+                <a16:creationId xmlns:a16="http://schemas.microsoft.com/office/drawing/2014/main" id="{56446361-C688-74A1-34AC-50DFA9E9D0FB}"/>
               </a:ext>
             </a:extLst>
           </p:cNvPr>
@@ -6986,7 +7677,7 @@
         </p:nvSpPr>
         <p:spPr>
           <a:xfrm>
-            <a:off x="4611702" y="3102174"/>
+            <a:off x="3748671" y="4650387"/>
             <a:ext cx="222422" cy="308919"/>
           </a:xfrm>
           <a:prstGeom prst="rect">
@@ -7020,10 +7711,10 @@
       </p:sp>
       <p:sp>
         <p:nvSpPr>
-          <p:cNvPr id="40" name="文本框 39">
-            <a:extLst>
-              <a:ext uri="{FF2B5EF4-FFF2-40B4-BE49-F238E27FC236}">
-                <a16:creationId xmlns:a16="http://schemas.microsoft.com/office/drawing/2014/main" id="{9AAA363C-306B-4993-AE15-FD4EA3D9B1E5}"/>
+          <p:cNvPr id="37" name="文本框 36">
+            <a:extLst>
+              <a:ext uri="{FF2B5EF4-FFF2-40B4-BE49-F238E27FC236}">
+                <a16:creationId xmlns:a16="http://schemas.microsoft.com/office/drawing/2014/main" id="{DA70A2B0-AFA7-9ADD-83A9-DF48BDF4B051}"/>
               </a:ext>
             </a:extLst>
           </p:cNvPr>
@@ -7032,8 +7723,8 @@
         </p:nvSpPr>
         <p:spPr>
           <a:xfrm>
-            <a:off x="7124422" y="2101547"/>
-            <a:ext cx="658642" cy="307777"/>
+            <a:off x="5765403" y="3927483"/>
+            <a:ext cx="248786" cy="369332"/>
           </a:xfrm>
           <a:prstGeom prst="rect">
             <a:avLst/>
@@ -7047,39 +7738,22 @@
           <a:lstStyle/>
           <a:p>
             <a:r>
-              <a:rPr lang="en-US" altLang="zh-CN" sz="1400" dirty="0">
+              <a:rPr lang="en-US" altLang="zh-CN" dirty="0">
                 <a:latin typeface="Arial" panose="020B0604020202020204" pitchFamily="34" charset="0"/>
                 <a:cs typeface="Arial" panose="020B0604020202020204" pitchFamily="34" charset="0"/>
               </a:rPr>
-              <a:t>(</a:t>
-            </a:r>
-            <a:r>
-              <a:rPr lang="en-US" altLang="zh-CN" sz="1400" dirty="0" err="1">
-                <a:latin typeface="Arial" panose="020B0604020202020204" pitchFamily="34" charset="0"/>
-                <a:cs typeface="Arial" panose="020B0604020202020204" pitchFamily="34" charset="0"/>
-              </a:rPr>
-              <a:t>x,y,z</a:t>
-            </a:r>
-            <a:r>
-              <a:rPr lang="en-US" altLang="zh-CN" sz="1400" dirty="0">
-                <a:latin typeface="Arial" panose="020B0604020202020204" pitchFamily="34" charset="0"/>
-                <a:cs typeface="Arial" panose="020B0604020202020204" pitchFamily="34" charset="0"/>
-              </a:rPr>
-              <a:t>)</a:t>
-            </a:r>
-            <a:endParaRPr lang="zh-CN" altLang="en-US" sz="1400" dirty="0">
-              <a:latin typeface="Arial" panose="020B0604020202020204" pitchFamily="34" charset="0"/>
-              <a:cs typeface="Arial" panose="020B0604020202020204" pitchFamily="34" charset="0"/>
-            </a:endParaRPr>
-          </a:p>
-        </p:txBody>
-      </p:sp>
-      <p:sp>
-        <p:nvSpPr>
-          <p:cNvPr id="41" name="椭圆 40">
-            <a:extLst>
-              <a:ext uri="{FF2B5EF4-FFF2-40B4-BE49-F238E27FC236}">
-                <a16:creationId xmlns:a16="http://schemas.microsoft.com/office/drawing/2014/main" id="{119FDB8A-2AD6-4838-9EDF-B5EBE8A075DB}"/>
+              <a:t>t</a:t>
+            </a:r>
+            <a:endParaRPr lang="zh-CN" altLang="en-US" dirty="0"/>
+          </a:p>
+        </p:txBody>
+      </p:sp>
+      <p:sp>
+        <p:nvSpPr>
+          <p:cNvPr id="4" name="弧形 3">
+            <a:extLst>
+              <a:ext uri="{FF2B5EF4-FFF2-40B4-BE49-F238E27FC236}">
+                <a16:creationId xmlns:a16="http://schemas.microsoft.com/office/drawing/2014/main" id="{25661CBC-CC9E-9883-F9B7-095A7B991178}"/>
               </a:ext>
             </a:extLst>
           </p:cNvPr>
@@ -7087,34 +7761,27 @@
           <p:nvPr/>
         </p:nvSpPr>
         <p:spPr>
-          <a:xfrm>
-            <a:off x="7419108" y="2431468"/>
-            <a:ext cx="72000" cy="72000"/>
+          <a:xfrm rot="1650714">
+            <a:off x="4863349" y="4720919"/>
+            <a:ext cx="169101" cy="255658"/>
           </a:xfrm>
-          <a:prstGeom prst="ellipse">
+          <a:prstGeom prst="arc">
             <a:avLst/>
           </a:prstGeom>
-          <a:solidFill>
-            <a:srgbClr val="FF0000"/>
-          </a:solidFill>
-          <a:ln>
-            <a:noFill/>
-          </a:ln>
+          <a:ln w="19050"/>
         </p:spPr>
         <p:style>
-          <a:lnRef idx="2">
-            <a:schemeClr val="accent1">
-              <a:shade val="50000"/>
-            </a:schemeClr>
+          <a:lnRef idx="1">
+            <a:schemeClr val="accent6"/>
           </a:lnRef>
-          <a:fillRef idx="1">
-            <a:schemeClr val="accent1"/>
+          <a:fillRef idx="0">
+            <a:schemeClr val="accent6"/>
           </a:fillRef>
           <a:effectRef idx="0">
-            <a:schemeClr val="accent1"/>
+            <a:schemeClr val="accent6"/>
           </a:effectRef>
           <a:fontRef idx="minor">
-            <a:schemeClr val="lt1"/>
+            <a:schemeClr val="tx1"/>
           </a:fontRef>
         </p:style>
         <p:txBody>
@@ -7128,10 +7795,10 @@
       </p:sp>
       <p:sp>
         <p:nvSpPr>
-          <p:cNvPr id="43" name="文本框 42">
-            <a:extLst>
-              <a:ext uri="{FF2B5EF4-FFF2-40B4-BE49-F238E27FC236}">
-                <a16:creationId xmlns:a16="http://schemas.microsoft.com/office/drawing/2014/main" id="{954042DA-0662-4E1F-B8BF-FB258C6A49F2}"/>
+          <p:cNvPr id="42" name="文本框 41">
+            <a:extLst>
+              <a:ext uri="{FF2B5EF4-FFF2-40B4-BE49-F238E27FC236}">
+                <a16:creationId xmlns:a16="http://schemas.microsoft.com/office/drawing/2014/main" id="{4B0725DD-81F2-BA26-0C67-0635A195E120}"/>
               </a:ext>
             </a:extLst>
           </p:cNvPr>
@@ -7140,8 +7807,8 @@
         </p:nvSpPr>
         <p:spPr>
           <a:xfrm>
-            <a:off x="7297290" y="3277559"/>
-            <a:ext cx="300082" cy="369332"/>
+            <a:off x="4993786" y="4652138"/>
+            <a:ext cx="518091" cy="276999"/>
           </a:xfrm>
           <a:prstGeom prst="rect">
             <a:avLst/>
@@ -7155,123 +7822,20 @@
           <a:lstStyle/>
           <a:p>
             <a:r>
-              <a:rPr lang="en-US" altLang="zh-CN" dirty="0">
+              <a:rPr lang="en-US" altLang="zh-CN" sz="1200" dirty="0" err="1">
                 <a:latin typeface="Arial" panose="020B0604020202020204" pitchFamily="34" charset="0"/>
                 <a:cs typeface="Arial" panose="020B0604020202020204" pitchFamily="34" charset="0"/>
               </a:rPr>
-              <a:t>z</a:t>
-            </a:r>
-            <a:endParaRPr lang="zh-CN" altLang="en-US" dirty="0"/>
-          </a:p>
-        </p:txBody>
-      </p:sp>
-      <p:sp>
-        <p:nvSpPr>
-          <p:cNvPr id="50" name="椭圆 49">
-            <a:extLst>
-              <a:ext uri="{FF2B5EF4-FFF2-40B4-BE49-F238E27FC236}">
-                <a16:creationId xmlns:a16="http://schemas.microsoft.com/office/drawing/2014/main" id="{98E19814-6C27-406A-B466-46DD7AA4E5C4}"/>
-              </a:ext>
-            </a:extLst>
-          </p:cNvPr>
-          <p:cNvSpPr/>
-          <p:nvPr/>
-        </p:nvSpPr>
-        <p:spPr>
-          <a:xfrm>
-            <a:off x="6788730" y="2736265"/>
-            <a:ext cx="72000" cy="72000"/>
-          </a:xfrm>
-          <a:prstGeom prst="ellipse">
-            <a:avLst/>
-          </a:prstGeom>
-          <a:solidFill>
-            <a:srgbClr val="FFC000"/>
-          </a:solidFill>
-          <a:ln>
-            <a:solidFill>
-              <a:srgbClr val="FFC000"/>
-            </a:solidFill>
-          </a:ln>
-        </p:spPr>
-        <p:style>
-          <a:lnRef idx="2">
-            <a:schemeClr val="accent1">
-              <a:shade val="50000"/>
-            </a:schemeClr>
-          </a:lnRef>
-          <a:fillRef idx="1">
-            <a:schemeClr val="accent1"/>
-          </a:fillRef>
-          <a:effectRef idx="0">
-            <a:schemeClr val="accent1"/>
-          </a:effectRef>
-          <a:fontRef idx="minor">
-            <a:schemeClr val="lt1"/>
-          </a:fontRef>
-        </p:style>
-        <p:txBody>
-          <a:bodyPr rtlCol="0" anchor="ctr"/>
-          <a:lstStyle/>
-          <a:p>
-            <a:pPr algn="ctr"/>
-            <a:endParaRPr lang="zh-CN" altLang="en-US"/>
-          </a:p>
-        </p:txBody>
-      </p:sp>
-      <p:sp>
-        <p:nvSpPr>
-          <p:cNvPr id="51" name="文本框 50">
-            <a:extLst>
-              <a:ext uri="{FF2B5EF4-FFF2-40B4-BE49-F238E27FC236}">
-                <a16:creationId xmlns:a16="http://schemas.microsoft.com/office/drawing/2014/main" id="{6AA91E26-DB99-4EC0-B146-72284774BE35}"/>
-              </a:ext>
-            </a:extLst>
-          </p:cNvPr>
-          <p:cNvSpPr txBox="1"/>
-          <p:nvPr/>
-        </p:nvSpPr>
-        <p:spPr>
-          <a:xfrm>
-            <a:off x="6434889" y="2419553"/>
-            <a:ext cx="785793" cy="307777"/>
-          </a:xfrm>
-          <a:prstGeom prst="rect">
-            <a:avLst/>
-          </a:prstGeom>
-          <a:noFill/>
-        </p:spPr>
-        <p:txBody>
-          <a:bodyPr wrap="none" rtlCol="0">
-            <a:spAutoFit/>
-          </a:bodyPr>
-          <a:lstStyle/>
-          <a:p>
-            <a:r>
-              <a:rPr lang="en-US" altLang="zh-CN" sz="1400" dirty="0">
+              <a:t>fov</a:t>
+            </a:r>
+            <a:r>
+              <a:rPr lang="en-US" altLang="zh-CN" sz="1200" dirty="0">
                 <a:latin typeface="Arial" panose="020B0604020202020204" pitchFamily="34" charset="0"/>
                 <a:cs typeface="Arial" panose="020B0604020202020204" pitchFamily="34" charset="0"/>
               </a:rPr>
-              <a:t>(</a:t>
-            </a:r>
-            <a:r>
-              <a:rPr lang="en-US" altLang="zh-CN" sz="1400" dirty="0" err="1">
-                <a:latin typeface="Arial" panose="020B0604020202020204" pitchFamily="34" charset="0"/>
-                <a:cs typeface="Arial" panose="020B0604020202020204" pitchFamily="34" charset="0"/>
-              </a:rPr>
-              <a:t>x’,y’,z</a:t>
-            </a:r>
-            <a:r>
-              <a:rPr lang="en-US" altLang="zh-CN" sz="1400" dirty="0">
-                <a:latin typeface="Arial" panose="020B0604020202020204" pitchFamily="34" charset="0"/>
-                <a:cs typeface="Arial" panose="020B0604020202020204" pitchFamily="34" charset="0"/>
-              </a:rPr>
-              <a:t>’)</a:t>
-            </a:r>
-            <a:endParaRPr lang="zh-CN" altLang="en-US" sz="1400" dirty="0">
-              <a:latin typeface="Arial" panose="020B0604020202020204" pitchFamily="34" charset="0"/>
-              <a:cs typeface="Arial" panose="020B0604020202020204" pitchFamily="34" charset="0"/>
-            </a:endParaRPr>
+              <a:t>/2</a:t>
+            </a:r>
+            <a:endParaRPr lang="zh-CN" altLang="en-US" sz="1200" dirty="0"/>
           </a:p>
         </p:txBody>
       </p:sp>

</xml_diff>